<commit_message>
L04 Remove useless empty slide
</commit_message>
<xml_diff>
--- a/Lectures/Lesson 04 - Home Task Overview.pptx
+++ b/Lectures/Lesson 04 - Home Task Overview.pptx
@@ -5,36 +5,35 @@
     <p:sldMasterId id="2147483648" r:id="rId1"/>
   </p:sldMasterIdLst>
   <p:notesMasterIdLst>
-    <p:notesMasterId r:id="rId29"/>
+    <p:notesMasterId r:id="rId28"/>
   </p:notesMasterIdLst>
   <p:sldIdLst>
-    <p:sldId id="256" r:id="rId2"/>
-    <p:sldId id="257" r:id="rId3"/>
-    <p:sldId id="364" r:id="rId4"/>
-    <p:sldId id="366" r:id="rId5"/>
-    <p:sldId id="374" r:id="rId6"/>
-    <p:sldId id="367" r:id="rId7"/>
-    <p:sldId id="375" r:id="rId8"/>
-    <p:sldId id="371" r:id="rId9"/>
-    <p:sldId id="377" r:id="rId10"/>
-    <p:sldId id="373" r:id="rId11"/>
-    <p:sldId id="378" r:id="rId12"/>
-    <p:sldId id="380" r:id="rId13"/>
-    <p:sldId id="383" r:id="rId14"/>
-    <p:sldId id="381" r:id="rId15"/>
-    <p:sldId id="387" r:id="rId16"/>
-    <p:sldId id="382" r:id="rId17"/>
-    <p:sldId id="388" r:id="rId18"/>
-    <p:sldId id="389" r:id="rId19"/>
-    <p:sldId id="386" r:id="rId20"/>
-    <p:sldId id="363" r:id="rId21"/>
-    <p:sldId id="345" r:id="rId22"/>
-    <p:sldId id="343" r:id="rId23"/>
-    <p:sldId id="390" r:id="rId24"/>
-    <p:sldId id="391" r:id="rId25"/>
-    <p:sldId id="392" r:id="rId26"/>
-    <p:sldId id="393" r:id="rId27"/>
-    <p:sldId id="394" r:id="rId28"/>
+    <p:sldId id="257" r:id="rId2"/>
+    <p:sldId id="364" r:id="rId3"/>
+    <p:sldId id="366" r:id="rId4"/>
+    <p:sldId id="374" r:id="rId5"/>
+    <p:sldId id="367" r:id="rId6"/>
+    <p:sldId id="375" r:id="rId7"/>
+    <p:sldId id="371" r:id="rId8"/>
+    <p:sldId id="377" r:id="rId9"/>
+    <p:sldId id="373" r:id="rId10"/>
+    <p:sldId id="378" r:id="rId11"/>
+    <p:sldId id="380" r:id="rId12"/>
+    <p:sldId id="383" r:id="rId13"/>
+    <p:sldId id="381" r:id="rId14"/>
+    <p:sldId id="387" r:id="rId15"/>
+    <p:sldId id="382" r:id="rId16"/>
+    <p:sldId id="388" r:id="rId17"/>
+    <p:sldId id="389" r:id="rId18"/>
+    <p:sldId id="386" r:id="rId19"/>
+    <p:sldId id="363" r:id="rId20"/>
+    <p:sldId id="345" r:id="rId21"/>
+    <p:sldId id="343" r:id="rId22"/>
+    <p:sldId id="390" r:id="rId23"/>
+    <p:sldId id="391" r:id="rId24"/>
+    <p:sldId id="392" r:id="rId25"/>
+    <p:sldId id="393" r:id="rId26"/>
+    <p:sldId id="394" r:id="rId27"/>
   </p:sldIdLst>
   <p:sldSz cx="12192000" cy="6858000"/>
   <p:notesSz cx="6858000" cy="9144000"/>
@@ -133,6 +132,11 @@
       </a:defRPr>
     </a:lvl9pPr>
   </p:defaultTextStyle>
+  <p:extLst>
+    <p:ext uri="{EFAFB233-063F-42B5-8137-9DF3F51BA10A}">
+      <p15:sldGuideLst xmlns:p15="http://schemas.microsoft.com/office/powerpoint/2012/main"/>
+    </p:ext>
+  </p:extLst>
 </p:presentation>
 </file>
 
@@ -218,7 +222,7 @@
           <a:p>
             <a:fld id="{77B78EEC-78A3-4083-8FAB-44BA06D976B5}" type="datetimeFigureOut">
               <a:rPr lang="en-US" smtClean="0"/>
-              <a:t>03-Nov-18</a:t>
+              <a:t>11/7/2018</a:t>
             </a:fld>
             <a:endParaRPr lang="en-US"/>
           </a:p>
@@ -377,7 +381,7 @@
           <a:p>
             <a:fld id="{356C9D8A-419D-492C-83E8-5DBD3F8F70D7}" type="slidenum">
               <a:rPr lang="en-US" smtClean="0"/>
-              <a:t>‹№›</a:t>
+              <a:t>‹#›</a:t>
             </a:fld>
             <a:endParaRPr lang="en-US"/>
           </a:p>
@@ -551,7 +555,7 @@
           <a:p>
             <a:fld id="{7DAB874B-A473-4B36-B711-1F4E2AA2CAB3}" type="slidenum">
               <a:rPr lang="en-US" smtClean="0"/>
-              <a:t>3</a:t>
+              <a:t>2</a:t>
             </a:fld>
             <a:endParaRPr lang="en-US"/>
           </a:p>
@@ -635,7 +639,7 @@
           <a:p>
             <a:fld id="{7DAB874B-A473-4B36-B711-1F4E2AA2CAB3}" type="slidenum">
               <a:rPr lang="en-US" smtClean="0"/>
-              <a:t>25</a:t>
+              <a:t>24</a:t>
             </a:fld>
             <a:endParaRPr lang="en-US"/>
           </a:p>
@@ -719,7 +723,7 @@
           <a:p>
             <a:fld id="{7DAB874B-A473-4B36-B711-1F4E2AA2CAB3}" type="slidenum">
               <a:rPr lang="en-US" smtClean="0"/>
-              <a:t>26</a:t>
+              <a:t>25</a:t>
             </a:fld>
             <a:endParaRPr lang="en-US"/>
           </a:p>
@@ -803,7 +807,7 @@
           <a:p>
             <a:fld id="{7DAB874B-A473-4B36-B711-1F4E2AA2CAB3}" type="slidenum">
               <a:rPr lang="en-US" smtClean="0"/>
-              <a:t>27</a:t>
+              <a:t>26</a:t>
             </a:fld>
             <a:endParaRPr lang="en-US"/>
           </a:p>
@@ -887,7 +891,7 @@
           <a:p>
             <a:fld id="{7DAB874B-A473-4B36-B711-1F4E2AA2CAB3}" type="slidenum">
               <a:rPr lang="en-US" smtClean="0"/>
-              <a:t>4</a:t>
+              <a:t>3</a:t>
             </a:fld>
             <a:endParaRPr lang="en-US"/>
           </a:p>
@@ -971,7 +975,7 @@
           <a:p>
             <a:fld id="{7DAB874B-A473-4B36-B711-1F4E2AA2CAB3}" type="slidenum">
               <a:rPr lang="en-US" smtClean="0"/>
-              <a:t>5</a:t>
+              <a:t>4</a:t>
             </a:fld>
             <a:endParaRPr lang="en-US"/>
           </a:p>
@@ -1066,7 +1070,7 @@
           <a:p>
             <a:fld id="{7DAB874B-A473-4B36-B711-1F4E2AA2CAB3}" type="slidenum">
               <a:rPr lang="en-US" smtClean="0"/>
-              <a:t>11</a:t>
+              <a:t>10</a:t>
             </a:fld>
             <a:endParaRPr lang="en-US"/>
           </a:p>
@@ -1153,7 +1157,7 @@
           <a:p>
             <a:fld id="{7DAB874B-A473-4B36-B711-1F4E2AA2CAB3}" type="slidenum">
               <a:rPr lang="en-US" smtClean="0"/>
-              <a:t>20</a:t>
+              <a:t>19</a:t>
             </a:fld>
             <a:endParaRPr lang="en-US"/>
           </a:p>
@@ -1240,7 +1244,7 @@
           <a:p>
             <a:fld id="{7DAB874B-A473-4B36-B711-1F4E2AA2CAB3}" type="slidenum">
               <a:rPr lang="en-US" smtClean="0"/>
-              <a:t>21</a:t>
+              <a:t>20</a:t>
             </a:fld>
             <a:endParaRPr lang="en-US"/>
           </a:p>
@@ -1333,7 +1337,7 @@
           <a:p>
             <a:fld id="{7DAB874B-A473-4B36-B711-1F4E2AA2CAB3}" type="slidenum">
               <a:rPr lang="en-US" smtClean="0"/>
-              <a:t>22</a:t>
+              <a:t>21</a:t>
             </a:fld>
             <a:endParaRPr lang="en-US"/>
           </a:p>
@@ -1417,7 +1421,7 @@
           <a:p>
             <a:fld id="{7DAB874B-A473-4B36-B711-1F4E2AA2CAB3}" type="slidenum">
               <a:rPr lang="en-US" smtClean="0"/>
-              <a:t>23</a:t>
+              <a:t>22</a:t>
             </a:fld>
             <a:endParaRPr lang="en-US"/>
           </a:p>
@@ -1501,7 +1505,7 @@
           <a:p>
             <a:fld id="{7DAB874B-A473-4B36-B711-1F4E2AA2CAB3}" type="slidenum">
               <a:rPr lang="en-US" smtClean="0"/>
-              <a:t>24</a:t>
+              <a:t>23</a:t>
             </a:fld>
             <a:endParaRPr lang="en-US"/>
           </a:p>
@@ -1669,7 +1673,7 @@
           <a:p>
             <a:fld id="{CA38B729-CE2E-41EB-A6D2-190ADE4340C1}" type="datetimeFigureOut">
               <a:rPr lang="en-US" smtClean="0"/>
-              <a:t>03-Nov-18</a:t>
+              <a:t>11/7/2018</a:t>
             </a:fld>
             <a:endParaRPr lang="en-US"/>
           </a:p>
@@ -1723,7 +1727,7 @@
           <a:p>
             <a:fld id="{8DDADB6F-EB1C-418F-8482-EA9CE57D81BF}" type="slidenum">
               <a:rPr lang="en-US" smtClean="0"/>
-              <a:t>‹№›</a:t>
+              <a:t>‹#›</a:t>
             </a:fld>
             <a:endParaRPr lang="en-US"/>
           </a:p>
@@ -1869,7 +1873,7 @@
           <a:p>
             <a:fld id="{CA38B729-CE2E-41EB-A6D2-190ADE4340C1}" type="datetimeFigureOut">
               <a:rPr lang="en-US" smtClean="0"/>
-              <a:t>03-Nov-18</a:t>
+              <a:t>11/7/2018</a:t>
             </a:fld>
             <a:endParaRPr lang="en-US"/>
           </a:p>
@@ -1923,7 +1927,7 @@
           <a:p>
             <a:fld id="{8DDADB6F-EB1C-418F-8482-EA9CE57D81BF}" type="slidenum">
               <a:rPr lang="en-US" smtClean="0"/>
-              <a:t>‹№›</a:t>
+              <a:t>‹#›</a:t>
             </a:fld>
             <a:endParaRPr lang="en-US"/>
           </a:p>
@@ -2079,7 +2083,7 @@
           <a:p>
             <a:fld id="{CA38B729-CE2E-41EB-A6D2-190ADE4340C1}" type="datetimeFigureOut">
               <a:rPr lang="en-US" smtClean="0"/>
-              <a:t>03-Nov-18</a:t>
+              <a:t>11/7/2018</a:t>
             </a:fld>
             <a:endParaRPr lang="en-US"/>
           </a:p>
@@ -2133,7 +2137,7 @@
           <a:p>
             <a:fld id="{8DDADB6F-EB1C-418F-8482-EA9CE57D81BF}" type="slidenum">
               <a:rPr lang="en-US" smtClean="0"/>
-              <a:t>‹№›</a:t>
+              <a:t>‹#›</a:t>
             </a:fld>
             <a:endParaRPr lang="en-US"/>
           </a:p>
@@ -2279,7 +2283,7 @@
           <a:p>
             <a:fld id="{CA38B729-CE2E-41EB-A6D2-190ADE4340C1}" type="datetimeFigureOut">
               <a:rPr lang="en-US" smtClean="0"/>
-              <a:t>03-Nov-18</a:t>
+              <a:t>11/7/2018</a:t>
             </a:fld>
             <a:endParaRPr lang="en-US"/>
           </a:p>
@@ -2333,7 +2337,7 @@
           <a:p>
             <a:fld id="{8DDADB6F-EB1C-418F-8482-EA9CE57D81BF}" type="slidenum">
               <a:rPr lang="en-US" smtClean="0"/>
-              <a:t>‹№›</a:t>
+              <a:t>‹#›</a:t>
             </a:fld>
             <a:endParaRPr lang="en-US"/>
           </a:p>
@@ -2555,7 +2559,7 @@
           <a:p>
             <a:fld id="{CA38B729-CE2E-41EB-A6D2-190ADE4340C1}" type="datetimeFigureOut">
               <a:rPr lang="en-US" smtClean="0"/>
-              <a:t>03-Nov-18</a:t>
+              <a:t>11/7/2018</a:t>
             </a:fld>
             <a:endParaRPr lang="en-US"/>
           </a:p>
@@ -2609,7 +2613,7 @@
           <a:p>
             <a:fld id="{8DDADB6F-EB1C-418F-8482-EA9CE57D81BF}" type="slidenum">
               <a:rPr lang="en-US" smtClean="0"/>
-              <a:t>‹№›</a:t>
+              <a:t>‹#›</a:t>
             </a:fld>
             <a:endParaRPr lang="en-US"/>
           </a:p>
@@ -2823,7 +2827,7 @@
           <a:p>
             <a:fld id="{CA38B729-CE2E-41EB-A6D2-190ADE4340C1}" type="datetimeFigureOut">
               <a:rPr lang="en-US" smtClean="0"/>
-              <a:t>03-Nov-18</a:t>
+              <a:t>11/7/2018</a:t>
             </a:fld>
             <a:endParaRPr lang="en-US"/>
           </a:p>
@@ -2877,7 +2881,7 @@
           <a:p>
             <a:fld id="{8DDADB6F-EB1C-418F-8482-EA9CE57D81BF}" type="slidenum">
               <a:rPr lang="en-US" smtClean="0"/>
-              <a:t>‹№›</a:t>
+              <a:t>‹#›</a:t>
             </a:fld>
             <a:endParaRPr lang="en-US"/>
           </a:p>
@@ -3238,7 +3242,7 @@
           <a:p>
             <a:fld id="{CA38B729-CE2E-41EB-A6D2-190ADE4340C1}" type="datetimeFigureOut">
               <a:rPr lang="en-US" smtClean="0"/>
-              <a:t>03-Nov-18</a:t>
+              <a:t>11/7/2018</a:t>
             </a:fld>
             <a:endParaRPr lang="en-US"/>
           </a:p>
@@ -3292,7 +3296,7 @@
           <a:p>
             <a:fld id="{8DDADB6F-EB1C-418F-8482-EA9CE57D81BF}" type="slidenum">
               <a:rPr lang="en-US" smtClean="0"/>
-              <a:t>‹№›</a:t>
+              <a:t>‹#›</a:t>
             </a:fld>
             <a:endParaRPr lang="en-US"/>
           </a:p>
@@ -3380,7 +3384,7 @@
           <a:p>
             <a:fld id="{CA38B729-CE2E-41EB-A6D2-190ADE4340C1}" type="datetimeFigureOut">
               <a:rPr lang="en-US" smtClean="0"/>
-              <a:t>03-Nov-18</a:t>
+              <a:t>11/7/2018</a:t>
             </a:fld>
             <a:endParaRPr lang="en-US"/>
           </a:p>
@@ -3434,7 +3438,7 @@
           <a:p>
             <a:fld id="{8DDADB6F-EB1C-418F-8482-EA9CE57D81BF}" type="slidenum">
               <a:rPr lang="en-US" smtClean="0"/>
-              <a:t>‹№›</a:t>
+              <a:t>‹#›</a:t>
             </a:fld>
             <a:endParaRPr lang="en-US"/>
           </a:p>
@@ -3493,7 +3497,7 @@
           <a:p>
             <a:fld id="{CA38B729-CE2E-41EB-A6D2-190ADE4340C1}" type="datetimeFigureOut">
               <a:rPr lang="en-US" smtClean="0"/>
-              <a:t>03-Nov-18</a:t>
+              <a:t>11/7/2018</a:t>
             </a:fld>
             <a:endParaRPr lang="en-US"/>
           </a:p>
@@ -3547,7 +3551,7 @@
           <a:p>
             <a:fld id="{8DDADB6F-EB1C-418F-8482-EA9CE57D81BF}" type="slidenum">
               <a:rPr lang="en-US" smtClean="0"/>
-              <a:t>‹№›</a:t>
+              <a:t>‹#›</a:t>
             </a:fld>
             <a:endParaRPr lang="en-US"/>
           </a:p>
@@ -3806,7 +3810,7 @@
           <a:p>
             <a:fld id="{CA38B729-CE2E-41EB-A6D2-190ADE4340C1}" type="datetimeFigureOut">
               <a:rPr lang="en-US" smtClean="0"/>
-              <a:t>03-Nov-18</a:t>
+              <a:t>11/7/2018</a:t>
             </a:fld>
             <a:endParaRPr lang="en-US"/>
           </a:p>
@@ -3860,7 +3864,7 @@
           <a:p>
             <a:fld id="{8DDADB6F-EB1C-418F-8482-EA9CE57D81BF}" type="slidenum">
               <a:rPr lang="en-US" smtClean="0"/>
-              <a:t>‹№›</a:t>
+              <a:t>‹#›</a:t>
             </a:fld>
             <a:endParaRPr lang="en-US"/>
           </a:p>
@@ -4095,7 +4099,7 @@
           <a:p>
             <a:fld id="{CA38B729-CE2E-41EB-A6D2-190ADE4340C1}" type="datetimeFigureOut">
               <a:rPr lang="en-US" smtClean="0"/>
-              <a:t>03-Nov-18</a:t>
+              <a:t>11/7/2018</a:t>
             </a:fld>
             <a:endParaRPr lang="en-US"/>
           </a:p>
@@ -4149,7 +4153,7 @@
           <a:p>
             <a:fld id="{8DDADB6F-EB1C-418F-8482-EA9CE57D81BF}" type="slidenum">
               <a:rPr lang="en-US" smtClean="0"/>
-              <a:t>‹№›</a:t>
+              <a:t>‹#›</a:t>
             </a:fld>
             <a:endParaRPr lang="en-US"/>
           </a:p>
@@ -4338,7 +4342,7 @@
           <a:p>
             <a:fld id="{CA38B729-CE2E-41EB-A6D2-190ADE4340C1}" type="datetimeFigureOut">
               <a:rPr lang="en-US" smtClean="0"/>
-              <a:t>03-Nov-18</a:t>
+              <a:t>11/7/2018</a:t>
             </a:fld>
             <a:endParaRPr lang="en-US"/>
           </a:p>
@@ -4428,7 +4432,7 @@
           <a:p>
             <a:fld id="{8DDADB6F-EB1C-418F-8482-EA9CE57D81BF}" type="slidenum">
               <a:rPr lang="en-US" smtClean="0"/>
-              <a:t>‹№›</a:t>
+              <a:t>‹#›</a:t>
             </a:fld>
             <a:endParaRPr lang="en-US"/>
           </a:p>
@@ -4757,13 +4761,7 @@
       </p:grpSpPr>
       <p:sp>
         <p:nvSpPr>
-          <p:cNvPr id="2" name="Заголовок 1">
-            <a:extLst>
-              <a:ext uri="{FF2B5EF4-FFF2-40B4-BE49-F238E27FC236}">
-                <a16:creationId xmlns:a16="http://schemas.microsoft.com/office/drawing/2014/main" id="{DF28FE91-B147-46A7-B1AD-9ADC329482A9}"/>
-              </a:ext>
-            </a:extLst>
-          </p:cNvPr>
+          <p:cNvPr id="2" name="Заголовок 1"/>
           <p:cNvSpPr>
             <a:spLocks noGrp="1"/>
           </p:cNvSpPr>
@@ -4776,19 +4774,17 @@
           <a:bodyPr/>
           <a:lstStyle/>
           <a:p>
-            <a:endParaRPr lang="en-US"/>
-          </a:p>
-        </p:txBody>
-      </p:sp>
-      <p:sp>
-        <p:nvSpPr>
-          <p:cNvPr id="3" name="Підзаголовок 2">
-            <a:extLst>
-              <a:ext uri="{FF2B5EF4-FFF2-40B4-BE49-F238E27FC236}">
-                <a16:creationId xmlns:a16="http://schemas.microsoft.com/office/drawing/2014/main" id="{7910A985-C0DD-466C-87C2-DF68FBCE4C9A}"/>
-              </a:ext>
-            </a:extLst>
-          </p:cNvPr>
+            <a:r>
+              <a:rPr lang="en-US" dirty="0"/>
+              <a:t>Java 4 WEB </a:t>
+            </a:r>
+            <a:endParaRPr lang="ru-RU" dirty="0"/>
+          </a:p>
+        </p:txBody>
+      </p:sp>
+      <p:sp>
+        <p:nvSpPr>
+          <p:cNvPr id="3" name="Подзаголовок 2"/>
           <p:cNvSpPr>
             <a:spLocks noGrp="1"/>
           </p:cNvSpPr>
@@ -4798,9 +4794,44 @@
         </p:nvSpPr>
         <p:spPr/>
         <p:txBody>
-          <a:bodyPr/>
-          <a:lstStyle/>
-          <a:p>
+          <a:bodyPr>
+            <a:normAutofit/>
+          </a:bodyPr>
+          <a:lstStyle/>
+          <a:p>
+            <a:r>
+              <a:rPr lang="en-US" sz="3200" dirty="0"/>
+              <a:t>Lesson 4 – Home tasks overview</a:t>
+            </a:r>
+            <a:endParaRPr lang="ru-RU" sz="3200" dirty="0"/>
+          </a:p>
+        </p:txBody>
+      </p:sp>
+      <p:sp>
+        <p:nvSpPr>
+          <p:cNvPr id="4" name="Місце для номера слайда 3">
+            <a:extLst>
+              <a:ext uri="{FF2B5EF4-FFF2-40B4-BE49-F238E27FC236}">
+                <a16:creationId xmlns:a16="http://schemas.microsoft.com/office/drawing/2014/main" id="{66E13E1E-21A2-4A4D-9E18-14B481079131}"/>
+              </a:ext>
+            </a:extLst>
+          </p:cNvPr>
+          <p:cNvSpPr>
+            <a:spLocks noGrp="1"/>
+          </p:cNvSpPr>
+          <p:nvPr>
+            <p:ph type="sldNum" sz="quarter" idx="12"/>
+          </p:nvPr>
+        </p:nvSpPr>
+        <p:spPr/>
+        <p:txBody>
+          <a:bodyPr/>
+          <a:lstStyle/>
+          <a:p>
+            <a:fld id="{C11E3E32-FD85-4051-B32D-C1D899658A24}" type="slidenum">
+              <a:rPr lang="en-US" smtClean="0"/>
+              <a:t>1</a:t>
+            </a:fld>
             <a:endParaRPr lang="en-US"/>
           </a:p>
         </p:txBody>
@@ -4808,7 +4839,7 @@
     </p:spTree>
     <p:extLst>
       <p:ext uri="{BB962C8B-B14F-4D97-AF65-F5344CB8AC3E}">
-        <p14:creationId xmlns:p14="http://schemas.microsoft.com/office/powerpoint/2010/main" val="342458197"/>
+        <p14:creationId xmlns:p14="http://schemas.microsoft.com/office/powerpoint/2010/main" val="3759336046"/>
       </p:ext>
     </p:extLst>
   </p:cSld>
@@ -4858,7 +4889,7 @@
           <a:p>
             <a:r>
               <a:rPr lang="en-US" dirty="0"/>
-              <a:t>4. Do not repeat yourself</a:t>
+              <a:t>5. Do not make extra operations</a:t>
             </a:r>
           </a:p>
         </p:txBody>
@@ -4888,124 +4919,6 @@
               <a:rPr lang="en-US" smtClean="0"/>
               <a:pPr/>
               <a:t>10</a:t>
-            </a:fld>
-            <a:endParaRPr lang="en-US"/>
-          </a:p>
-        </p:txBody>
-      </p:sp>
-      <p:pic>
-        <p:nvPicPr>
-          <p:cNvPr id="5" name="Рисунок 4">
-            <a:extLst>
-              <a:ext uri="{FF2B5EF4-FFF2-40B4-BE49-F238E27FC236}">
-                <a16:creationId xmlns:a16="http://schemas.microsoft.com/office/drawing/2014/main" id="{4EFBC76C-BB61-4223-8CCF-760CFF7CEF7D}"/>
-              </a:ext>
-            </a:extLst>
-          </p:cNvPr>
-          <p:cNvPicPr>
-            <a:picLocks noChangeAspect="1"/>
-          </p:cNvPicPr>
-          <p:nvPr/>
-        </p:nvPicPr>
-        <p:blipFill>
-          <a:blip r:embed="rId2"/>
-          <a:stretch>
-            <a:fillRect/>
-          </a:stretch>
-        </p:blipFill>
-        <p:spPr>
-          <a:xfrm>
-            <a:off x="838200" y="1690688"/>
-            <a:ext cx="4503821" cy="3726183"/>
-          </a:xfrm>
-          <a:prstGeom prst="rect">
-            <a:avLst/>
-          </a:prstGeom>
-        </p:spPr>
-      </p:pic>
-    </p:spTree>
-    <p:extLst>
-      <p:ext uri="{BB962C8B-B14F-4D97-AF65-F5344CB8AC3E}">
-        <p14:creationId xmlns:p14="http://schemas.microsoft.com/office/powerpoint/2010/main" val="1380537162"/>
-      </p:ext>
-    </p:extLst>
-  </p:cSld>
-  <p:clrMapOvr>
-    <a:masterClrMapping/>
-  </p:clrMapOvr>
-</p:sld>
-</file>
-
-<file path=ppt/slides/slide11.xml><?xml version="1.0" encoding="utf-8"?>
-<p:sld xmlns:a="http://schemas.openxmlformats.org/drawingml/2006/main" xmlns:r="http://schemas.openxmlformats.org/officeDocument/2006/relationships" xmlns:p="http://schemas.openxmlformats.org/presentationml/2006/main">
-  <p:cSld>
-    <p:spTree>
-      <p:nvGrpSpPr>
-        <p:cNvPr id="1" name=""/>
-        <p:cNvGrpSpPr/>
-        <p:nvPr/>
-      </p:nvGrpSpPr>
-      <p:grpSpPr>
-        <a:xfrm>
-          <a:off x="0" y="0"/>
-          <a:ext cx="0" cy="0"/>
-          <a:chOff x="0" y="0"/>
-          <a:chExt cx="0" cy="0"/>
-        </a:xfrm>
-      </p:grpSpPr>
-      <p:sp>
-        <p:nvSpPr>
-          <p:cNvPr id="10" name="Заголовок 9">
-            <a:extLst>
-              <a:ext uri="{FF2B5EF4-FFF2-40B4-BE49-F238E27FC236}">
-                <a16:creationId xmlns:a16="http://schemas.microsoft.com/office/drawing/2014/main" id="{909B3017-F4BF-4B1F-BF61-6B6E83D556F0}"/>
-              </a:ext>
-            </a:extLst>
-          </p:cNvPr>
-          <p:cNvSpPr>
-            <a:spLocks noGrp="1"/>
-          </p:cNvSpPr>
-          <p:nvPr>
-            <p:ph type="title"/>
-          </p:nvPr>
-        </p:nvSpPr>
-        <p:spPr/>
-        <p:txBody>
-          <a:bodyPr/>
-          <a:lstStyle/>
-          <a:p>
-            <a:r>
-              <a:rPr lang="en-US" dirty="0"/>
-              <a:t>5. Do not make extra operations</a:t>
-            </a:r>
-          </a:p>
-        </p:txBody>
-      </p:sp>
-      <p:sp>
-        <p:nvSpPr>
-          <p:cNvPr id="4" name="Місце для номера слайда 3">
-            <a:extLst>
-              <a:ext uri="{FF2B5EF4-FFF2-40B4-BE49-F238E27FC236}">
-                <a16:creationId xmlns:a16="http://schemas.microsoft.com/office/drawing/2014/main" id="{C5B93587-59CA-4580-89B4-58819BDFD0E5}"/>
-              </a:ext>
-            </a:extLst>
-          </p:cNvPr>
-          <p:cNvSpPr>
-            <a:spLocks noGrp="1"/>
-          </p:cNvSpPr>
-          <p:nvPr>
-            <p:ph type="sldNum" sz="quarter" idx="12"/>
-          </p:nvPr>
-        </p:nvSpPr>
-        <p:spPr/>
-        <p:txBody>
-          <a:bodyPr/>
-          <a:lstStyle/>
-          <a:p>
-            <a:fld id="{C11E3E32-FD85-4051-B32D-C1D899658A24}" type="slidenum">
-              <a:rPr lang="en-US" smtClean="0"/>
-              <a:pPr/>
-              <a:t>11</a:t>
             </a:fld>
             <a:endParaRPr lang="en-US"/>
           </a:p>
@@ -5054,7 +4967,7 @@
 </p:sld>
 </file>
 
-<file path=ppt/slides/slide12.xml><?xml version="1.0" encoding="utf-8"?>
+<file path=ppt/slides/slide11.xml><?xml version="1.0" encoding="utf-8"?>
 <p:sld xmlns:a="http://schemas.openxmlformats.org/drawingml/2006/main" xmlns:r="http://schemas.openxmlformats.org/officeDocument/2006/relationships" xmlns:p="http://schemas.openxmlformats.org/presentationml/2006/main">
   <p:cSld>
     <p:spTree>
@@ -5123,7 +5036,7 @@
             <a:fld id="{C11E3E32-FD85-4051-B32D-C1D899658A24}" type="slidenum">
               <a:rPr lang="en-US" smtClean="0"/>
               <a:pPr/>
-              <a:t>12</a:t>
+              <a:t>11</a:t>
             </a:fld>
             <a:endParaRPr lang="en-US"/>
           </a:p>
@@ -5172,7 +5085,7 @@
 </p:sld>
 </file>
 
-<file path=ppt/slides/slide13.xml><?xml version="1.0" encoding="utf-8"?>
+<file path=ppt/slides/slide12.xml><?xml version="1.0" encoding="utf-8"?>
 <p:sld xmlns:a="http://schemas.openxmlformats.org/drawingml/2006/main" xmlns:r="http://schemas.openxmlformats.org/officeDocument/2006/relationships" xmlns:p="http://schemas.openxmlformats.org/presentationml/2006/main">
   <p:cSld>
     <p:spTree>
@@ -5241,7 +5154,7 @@
             <a:fld id="{C11E3E32-FD85-4051-B32D-C1D899658A24}" type="slidenum">
               <a:rPr lang="en-US" smtClean="0"/>
               <a:pPr/>
-              <a:t>13</a:t>
+              <a:t>12</a:t>
             </a:fld>
             <a:endParaRPr lang="en-US"/>
           </a:p>
@@ -5290,7 +5203,7 @@
 </p:sld>
 </file>
 
-<file path=ppt/slides/slide14.xml><?xml version="1.0" encoding="utf-8"?>
+<file path=ppt/slides/slide13.xml><?xml version="1.0" encoding="utf-8"?>
 <p:sld xmlns:a="http://schemas.openxmlformats.org/drawingml/2006/main" xmlns:r="http://schemas.openxmlformats.org/officeDocument/2006/relationships" xmlns:p="http://schemas.openxmlformats.org/presentationml/2006/main">
   <p:cSld>
     <p:spTree>
@@ -5359,7 +5272,7 @@
             <a:fld id="{C11E3E32-FD85-4051-B32D-C1D899658A24}" type="slidenum">
               <a:rPr lang="en-US" smtClean="0"/>
               <a:pPr/>
-              <a:t>14</a:t>
+              <a:t>13</a:t>
             </a:fld>
             <a:endParaRPr lang="en-US"/>
           </a:p>
@@ -5408,7 +5321,7 @@
 </p:sld>
 </file>
 
-<file path=ppt/slides/slide15.xml><?xml version="1.0" encoding="utf-8"?>
+<file path=ppt/slides/slide14.xml><?xml version="1.0" encoding="utf-8"?>
 <p:sld xmlns:a="http://schemas.openxmlformats.org/drawingml/2006/main" xmlns:r="http://schemas.openxmlformats.org/officeDocument/2006/relationships" xmlns:p="http://schemas.openxmlformats.org/presentationml/2006/main">
   <p:cSld>
     <p:spTree>
@@ -5477,7 +5390,7 @@
             <a:fld id="{C11E3E32-FD85-4051-B32D-C1D899658A24}" type="slidenum">
               <a:rPr lang="en-US" smtClean="0"/>
               <a:pPr/>
-              <a:t>15</a:t>
+              <a:t>14</a:t>
             </a:fld>
             <a:endParaRPr lang="en-US"/>
           </a:p>
@@ -5526,7 +5439,7 @@
 </p:sld>
 </file>
 
-<file path=ppt/slides/slide16.xml><?xml version="1.0" encoding="utf-8"?>
+<file path=ppt/slides/slide15.xml><?xml version="1.0" encoding="utf-8"?>
 <p:sld xmlns:a="http://schemas.openxmlformats.org/drawingml/2006/main" xmlns:r="http://schemas.openxmlformats.org/officeDocument/2006/relationships" xmlns:p="http://schemas.openxmlformats.org/presentationml/2006/main">
   <p:cSld>
     <p:spTree>
@@ -5595,7 +5508,7 @@
             <a:fld id="{C11E3E32-FD85-4051-B32D-C1D899658A24}" type="slidenum">
               <a:rPr lang="en-US" smtClean="0"/>
               <a:pPr/>
-              <a:t>16</a:t>
+              <a:t>15</a:t>
             </a:fld>
             <a:endParaRPr lang="en-US"/>
           </a:p>
@@ -5644,7 +5557,7 @@
 </p:sld>
 </file>
 
-<file path=ppt/slides/slide17.xml><?xml version="1.0" encoding="utf-8"?>
+<file path=ppt/slides/slide16.xml><?xml version="1.0" encoding="utf-8"?>
 <p:sld xmlns:a="http://schemas.openxmlformats.org/drawingml/2006/main" xmlns:r="http://schemas.openxmlformats.org/officeDocument/2006/relationships" xmlns:p="http://schemas.openxmlformats.org/presentationml/2006/main">
   <p:cSld>
     <p:spTree>
@@ -5713,7 +5626,7 @@
             <a:fld id="{C11E3E32-FD85-4051-B32D-C1D899658A24}" type="slidenum">
               <a:rPr lang="en-US" smtClean="0"/>
               <a:pPr/>
-              <a:t>17</a:t>
+              <a:t>16</a:t>
             </a:fld>
             <a:endParaRPr lang="en-US"/>
           </a:p>
@@ -5762,7 +5675,7 @@
 </p:sld>
 </file>
 
-<file path=ppt/slides/slide18.xml><?xml version="1.0" encoding="utf-8"?>
+<file path=ppt/slides/slide17.xml><?xml version="1.0" encoding="utf-8"?>
 <p:sld xmlns:a="http://schemas.openxmlformats.org/drawingml/2006/main" xmlns:r="http://schemas.openxmlformats.org/officeDocument/2006/relationships" xmlns:p="http://schemas.openxmlformats.org/presentationml/2006/main">
   <p:cSld>
     <p:spTree>
@@ -5831,7 +5744,7 @@
             <a:fld id="{C11E3E32-FD85-4051-B32D-C1D899658A24}" type="slidenum">
               <a:rPr lang="en-US" smtClean="0"/>
               <a:pPr/>
-              <a:t>18</a:t>
+              <a:t>17</a:t>
             </a:fld>
             <a:endParaRPr lang="en-US"/>
           </a:p>
@@ -5880,7 +5793,7 @@
 </p:sld>
 </file>
 
-<file path=ppt/slides/slide19.xml><?xml version="1.0" encoding="utf-8"?>
+<file path=ppt/slides/slide18.xml><?xml version="1.0" encoding="utf-8"?>
 <p:sld xmlns:a="http://schemas.openxmlformats.org/drawingml/2006/main" xmlns:r="http://schemas.openxmlformats.org/officeDocument/2006/relationships" xmlns:p="http://schemas.openxmlformats.org/presentationml/2006/main">
   <p:cSld>
     <p:spTree>
@@ -5949,7 +5862,7 @@
             <a:fld id="{C11E3E32-FD85-4051-B32D-C1D899658A24}" type="slidenum">
               <a:rPr lang="en-US" smtClean="0"/>
               <a:pPr/>
-              <a:t>19</a:t>
+              <a:t>18</a:t>
             </a:fld>
             <a:endParaRPr lang="en-US"/>
           </a:p>
@@ -6028,7 +5941,7 @@
 </p:sld>
 </file>
 
-<file path=ppt/slides/slide2.xml><?xml version="1.0" encoding="utf-8"?>
+<file path=ppt/slides/slide19.xml><?xml version="1.0" encoding="utf-8"?>
 <p:sld xmlns:a="http://schemas.openxmlformats.org/drawingml/2006/main" xmlns:r="http://schemas.openxmlformats.org/officeDocument/2006/relationships" xmlns:p="http://schemas.openxmlformats.org/presentationml/2006/main">
   <p:cSld>
     <p:spTree>
@@ -6047,113 +5960,6 @@
       </p:grpSpPr>
       <p:sp>
         <p:nvSpPr>
-          <p:cNvPr id="2" name="Заголовок 1"/>
-          <p:cNvSpPr>
-            <a:spLocks noGrp="1"/>
-          </p:cNvSpPr>
-          <p:nvPr>
-            <p:ph type="ctrTitle"/>
-          </p:nvPr>
-        </p:nvSpPr>
-        <p:spPr/>
-        <p:txBody>
-          <a:bodyPr/>
-          <a:lstStyle/>
-          <a:p>
-            <a:r>
-              <a:rPr lang="en-US" dirty="0"/>
-              <a:t>Java 4 WEB </a:t>
-            </a:r>
-            <a:endParaRPr lang="ru-RU" dirty="0"/>
-          </a:p>
-        </p:txBody>
-      </p:sp>
-      <p:sp>
-        <p:nvSpPr>
-          <p:cNvPr id="3" name="Подзаголовок 2"/>
-          <p:cNvSpPr>
-            <a:spLocks noGrp="1"/>
-          </p:cNvSpPr>
-          <p:nvPr>
-            <p:ph type="subTitle" idx="1"/>
-          </p:nvPr>
-        </p:nvSpPr>
-        <p:spPr/>
-        <p:txBody>
-          <a:bodyPr>
-            <a:normAutofit/>
-          </a:bodyPr>
-          <a:lstStyle/>
-          <a:p>
-            <a:r>
-              <a:rPr lang="en-US" sz="3200" dirty="0"/>
-              <a:t>Lesson 4 – Home tasks overview</a:t>
-            </a:r>
-            <a:endParaRPr lang="ru-RU" sz="3200" dirty="0"/>
-          </a:p>
-        </p:txBody>
-      </p:sp>
-      <p:sp>
-        <p:nvSpPr>
-          <p:cNvPr id="4" name="Місце для номера слайда 3">
-            <a:extLst>
-              <a:ext uri="{FF2B5EF4-FFF2-40B4-BE49-F238E27FC236}">
-                <a16:creationId xmlns:a16="http://schemas.microsoft.com/office/drawing/2014/main" id="{66E13E1E-21A2-4A4D-9E18-14B481079131}"/>
-              </a:ext>
-            </a:extLst>
-          </p:cNvPr>
-          <p:cNvSpPr>
-            <a:spLocks noGrp="1"/>
-          </p:cNvSpPr>
-          <p:nvPr>
-            <p:ph type="sldNum" sz="quarter" idx="12"/>
-          </p:nvPr>
-        </p:nvSpPr>
-        <p:spPr/>
-        <p:txBody>
-          <a:bodyPr/>
-          <a:lstStyle/>
-          <a:p>
-            <a:fld id="{C11E3E32-FD85-4051-B32D-C1D899658A24}" type="slidenum">
-              <a:rPr lang="en-US" smtClean="0"/>
-              <a:t>2</a:t>
-            </a:fld>
-            <a:endParaRPr lang="en-US"/>
-          </a:p>
-        </p:txBody>
-      </p:sp>
-    </p:spTree>
-    <p:extLst>
-      <p:ext uri="{BB962C8B-B14F-4D97-AF65-F5344CB8AC3E}">
-        <p14:creationId xmlns:p14="http://schemas.microsoft.com/office/powerpoint/2010/main" val="3759336046"/>
-      </p:ext>
-    </p:extLst>
-  </p:cSld>
-  <p:clrMapOvr>
-    <a:masterClrMapping/>
-  </p:clrMapOvr>
-</p:sld>
-</file>
-
-<file path=ppt/slides/slide20.xml><?xml version="1.0" encoding="utf-8"?>
-<p:sld xmlns:a="http://schemas.openxmlformats.org/drawingml/2006/main" xmlns:r="http://schemas.openxmlformats.org/officeDocument/2006/relationships" xmlns:p="http://schemas.openxmlformats.org/presentationml/2006/main">
-  <p:cSld>
-    <p:spTree>
-      <p:nvGrpSpPr>
-        <p:cNvPr id="1" name=""/>
-        <p:cNvGrpSpPr/>
-        <p:nvPr/>
-      </p:nvGrpSpPr>
-      <p:grpSpPr>
-        <a:xfrm>
-          <a:off x="0" y="0"/>
-          <a:ext cx="0" cy="0"/>
-          <a:chOff x="0" y="0"/>
-          <a:chExt cx="0" cy="0"/>
-        </a:xfrm>
-      </p:grpSpPr>
-      <p:sp>
-        <p:nvSpPr>
           <p:cNvPr id="2" name="Title 1"/>
           <p:cNvSpPr>
             <a:spLocks noGrp="1"/>
@@ -6192,7 +5998,7 @@
           <a:p>
             <a:fld id="{C11E3E32-FD85-4051-B32D-C1D899658A24}" type="slidenum">
               <a:rPr lang="en-US" smtClean="0"/>
-              <a:t>20</a:t>
+              <a:t>19</a:t>
             </a:fld>
             <a:endParaRPr lang="en-US"/>
           </a:p>
@@ -6241,7 +6047,7 @@
 </p:sld>
 </file>
 
-<file path=ppt/slides/slide21.xml><?xml version="1.0" encoding="utf-8"?>
+<file path=ppt/slides/slide2.xml><?xml version="1.0" encoding="utf-8"?>
 <p:sld xmlns:a="http://schemas.openxmlformats.org/drawingml/2006/main" xmlns:r="http://schemas.openxmlformats.org/officeDocument/2006/relationships" xmlns:p="http://schemas.openxmlformats.org/presentationml/2006/main">
   <p:cSld>
     <p:spTree>
@@ -6275,6 +6081,112 @@
           <a:p>
             <a:r>
               <a:rPr lang="en-US" dirty="0"/>
+              <a:t>1. Do not declare unchecked exceptions</a:t>
+            </a:r>
+            <a:endParaRPr lang="en-US" b="1" dirty="0"/>
+          </a:p>
+        </p:txBody>
+      </p:sp>
+      <p:sp>
+        <p:nvSpPr>
+          <p:cNvPr id="4" name="Slide Number Placeholder 3"/>
+          <p:cNvSpPr>
+            <a:spLocks noGrp="1"/>
+          </p:cNvSpPr>
+          <p:nvPr>
+            <p:ph type="sldNum" sz="quarter" idx="12"/>
+          </p:nvPr>
+        </p:nvSpPr>
+        <p:spPr/>
+        <p:txBody>
+          <a:bodyPr/>
+          <a:lstStyle/>
+          <a:p>
+            <a:fld id="{C11E3E32-FD85-4051-B32D-C1D899658A24}" type="slidenum">
+              <a:rPr lang="en-US" smtClean="0"/>
+              <a:t>2</a:t>
+            </a:fld>
+            <a:endParaRPr lang="en-US"/>
+          </a:p>
+        </p:txBody>
+      </p:sp>
+      <p:pic>
+        <p:nvPicPr>
+          <p:cNvPr id="8" name="Рисунок 7">
+            <a:extLst>
+              <a:ext uri="{FF2B5EF4-FFF2-40B4-BE49-F238E27FC236}">
+                <a16:creationId xmlns:a16="http://schemas.microsoft.com/office/drawing/2014/main" id="{CE003B94-A041-4E4B-952E-F3A2DF86534B}"/>
+              </a:ext>
+            </a:extLst>
+          </p:cNvPr>
+          <p:cNvPicPr>
+            <a:picLocks noChangeAspect="1"/>
+          </p:cNvPicPr>
+          <p:nvPr/>
+        </p:nvPicPr>
+        <p:blipFill>
+          <a:blip r:embed="rId3"/>
+          <a:stretch>
+            <a:fillRect/>
+          </a:stretch>
+        </p:blipFill>
+        <p:spPr>
+          <a:xfrm>
+            <a:off x="838200" y="1690688"/>
+            <a:ext cx="5419323" cy="4747903"/>
+          </a:xfrm>
+          <a:prstGeom prst="rect">
+            <a:avLst/>
+          </a:prstGeom>
+        </p:spPr>
+      </p:pic>
+    </p:spTree>
+    <p:extLst>
+      <p:ext uri="{BB962C8B-B14F-4D97-AF65-F5344CB8AC3E}">
+        <p14:creationId xmlns:p14="http://schemas.microsoft.com/office/powerpoint/2010/main" val="634241247"/>
+      </p:ext>
+    </p:extLst>
+  </p:cSld>
+  <p:clrMapOvr>
+    <a:masterClrMapping/>
+  </p:clrMapOvr>
+</p:sld>
+</file>
+
+<file path=ppt/slides/slide20.xml><?xml version="1.0" encoding="utf-8"?>
+<p:sld xmlns:a="http://schemas.openxmlformats.org/drawingml/2006/main" xmlns:r="http://schemas.openxmlformats.org/officeDocument/2006/relationships" xmlns:p="http://schemas.openxmlformats.org/presentationml/2006/main">
+  <p:cSld>
+    <p:spTree>
+      <p:nvGrpSpPr>
+        <p:cNvPr id="1" name=""/>
+        <p:cNvGrpSpPr/>
+        <p:nvPr/>
+      </p:nvGrpSpPr>
+      <p:grpSpPr>
+        <a:xfrm>
+          <a:off x="0" y="0"/>
+          <a:ext cx="0" cy="0"/>
+          <a:chOff x="0" y="0"/>
+          <a:chExt cx="0" cy="0"/>
+        </a:xfrm>
+      </p:grpSpPr>
+      <p:sp>
+        <p:nvSpPr>
+          <p:cNvPr id="2" name="Title 1"/>
+          <p:cNvSpPr>
+            <a:spLocks noGrp="1"/>
+          </p:cNvSpPr>
+          <p:nvPr>
+            <p:ph type="title"/>
+          </p:nvPr>
+        </p:nvSpPr>
+        <p:spPr/>
+        <p:txBody>
+          <a:bodyPr/>
+          <a:lstStyle/>
+          <a:p>
+            <a:r>
+              <a:rPr lang="en-US" dirty="0"/>
               <a:t>10. Bad big code</a:t>
             </a:r>
           </a:p>
@@ -6297,7 +6209,7 @@
           <a:p>
             <a:fld id="{C11E3E32-FD85-4051-B32D-C1D899658A24}" type="slidenum">
               <a:rPr lang="en-US" smtClean="0"/>
-              <a:t>21</a:t>
+              <a:t>20</a:t>
             </a:fld>
             <a:endParaRPr lang="en-US"/>
           </a:p>
@@ -6346,7 +6258,7 @@
 </p:sld>
 </file>
 
-<file path=ppt/slides/slide22.xml><?xml version="1.0" encoding="utf-8"?>
+<file path=ppt/slides/slide21.xml><?xml version="1.0" encoding="utf-8"?>
 <p:sld xmlns:a="http://schemas.openxmlformats.org/drawingml/2006/main" xmlns:r="http://schemas.openxmlformats.org/officeDocument/2006/relationships" xmlns:p="http://schemas.openxmlformats.org/presentationml/2006/main">
   <p:cSld>
     <p:spTree>
@@ -6434,7 +6346,7 @@
           <a:p>
             <a:fld id="{C11E3E32-FD85-4051-B32D-C1D899658A24}" type="slidenum">
               <a:rPr lang="en-US" smtClean="0"/>
-              <a:t>22</a:t>
+              <a:t>21</a:t>
             </a:fld>
             <a:endParaRPr lang="en-US" dirty="0"/>
           </a:p>
@@ -6909,7 +6821,7 @@
 </p:sld>
 </file>
 
-<file path=ppt/slides/slide23.xml><?xml version="1.0" encoding="utf-8"?>
+<file path=ppt/slides/slide22.xml><?xml version="1.0" encoding="utf-8"?>
 <p:sld xmlns:a="http://schemas.openxmlformats.org/drawingml/2006/main" xmlns:r="http://schemas.openxmlformats.org/officeDocument/2006/relationships" xmlns:p="http://schemas.openxmlformats.org/presentationml/2006/main">
   <p:cSld>
     <p:spTree>
@@ -6965,7 +6877,7 @@
           <a:p>
             <a:fld id="{C11E3E32-FD85-4051-B32D-C1D899658A24}" type="slidenum">
               <a:rPr lang="en-US" smtClean="0"/>
-              <a:t>23</a:t>
+              <a:t>22</a:t>
             </a:fld>
             <a:endParaRPr lang="en-US" dirty="0"/>
           </a:p>
@@ -7470,7 +7382,7 @@
 </p:sld>
 </file>
 
-<file path=ppt/slides/slide24.xml><?xml version="1.0" encoding="utf-8"?>
+<file path=ppt/slides/slide23.xml><?xml version="1.0" encoding="utf-8"?>
 <p:sld xmlns:a="http://schemas.openxmlformats.org/drawingml/2006/main" xmlns:r="http://schemas.openxmlformats.org/officeDocument/2006/relationships" xmlns:p="http://schemas.openxmlformats.org/presentationml/2006/main">
   <p:cSld>
     <p:spTree>
@@ -7526,7 +7438,7 @@
           <a:p>
             <a:fld id="{C11E3E32-FD85-4051-B32D-C1D899658A24}" type="slidenum">
               <a:rPr lang="en-US" smtClean="0"/>
-              <a:t>24</a:t>
+              <a:t>23</a:t>
             </a:fld>
             <a:endParaRPr lang="en-US" dirty="0"/>
           </a:p>
@@ -8001,7 +7913,7 @@
 </p:sld>
 </file>
 
-<file path=ppt/slides/slide25.xml><?xml version="1.0" encoding="utf-8"?>
+<file path=ppt/slides/slide24.xml><?xml version="1.0" encoding="utf-8"?>
 <p:sld xmlns:a="http://schemas.openxmlformats.org/drawingml/2006/main" xmlns:r="http://schemas.openxmlformats.org/officeDocument/2006/relationships" xmlns:p="http://schemas.openxmlformats.org/presentationml/2006/main">
   <p:cSld>
     <p:spTree>
@@ -8057,7 +7969,7 @@
           <a:p>
             <a:fld id="{C11E3E32-FD85-4051-B32D-C1D899658A24}" type="slidenum">
               <a:rPr lang="en-US" smtClean="0"/>
-              <a:t>25</a:t>
+              <a:t>24</a:t>
             </a:fld>
             <a:endParaRPr lang="en-US" dirty="0"/>
           </a:p>
@@ -8532,7 +8444,7 @@
 </p:sld>
 </file>
 
-<file path=ppt/slides/slide26.xml><?xml version="1.0" encoding="utf-8"?>
+<file path=ppt/slides/slide25.xml><?xml version="1.0" encoding="utf-8"?>
 <p:sld xmlns:a="http://schemas.openxmlformats.org/drawingml/2006/main" xmlns:r="http://schemas.openxmlformats.org/officeDocument/2006/relationships" xmlns:p="http://schemas.openxmlformats.org/presentationml/2006/main">
   <p:cSld>
     <p:spTree>
@@ -8588,7 +8500,7 @@
           <a:p>
             <a:fld id="{C11E3E32-FD85-4051-B32D-C1D899658A24}" type="slidenum">
               <a:rPr lang="en-US" smtClean="0"/>
-              <a:t>26</a:t>
+              <a:t>25</a:t>
             </a:fld>
             <a:endParaRPr lang="en-US" dirty="0"/>
           </a:p>
@@ -9093,7 +9005,7 @@
 </p:sld>
 </file>
 
-<file path=ppt/slides/slide27.xml><?xml version="1.0" encoding="utf-8"?>
+<file path=ppt/slides/slide26.xml><?xml version="1.0" encoding="utf-8"?>
 <p:sld xmlns:a="http://schemas.openxmlformats.org/drawingml/2006/main" xmlns:r="http://schemas.openxmlformats.org/officeDocument/2006/relationships" xmlns:p="http://schemas.openxmlformats.org/presentationml/2006/main">
   <p:cSld>
     <p:spTree>
@@ -9209,7 +9121,7 @@
             <a:fld id="{C11E3E32-FD85-4051-B32D-C1D899658A24}" type="slidenum">
               <a:rPr lang="en-US" smtClean="0"/>
               <a:pPr/>
-              <a:t>27</a:t>
+              <a:t>26</a:t>
             </a:fld>
             <a:endParaRPr lang="en-US" dirty="0"/>
           </a:p>
@@ -9743,112 +9655,6 @@
             <a:fld id="{C11E3E32-FD85-4051-B32D-C1D899658A24}" type="slidenum">
               <a:rPr lang="en-US" smtClean="0"/>
               <a:t>3</a:t>
-            </a:fld>
-            <a:endParaRPr lang="en-US"/>
-          </a:p>
-        </p:txBody>
-      </p:sp>
-      <p:pic>
-        <p:nvPicPr>
-          <p:cNvPr id="8" name="Рисунок 7">
-            <a:extLst>
-              <a:ext uri="{FF2B5EF4-FFF2-40B4-BE49-F238E27FC236}">
-                <a16:creationId xmlns:a16="http://schemas.microsoft.com/office/drawing/2014/main" id="{CE003B94-A041-4E4B-952E-F3A2DF86534B}"/>
-              </a:ext>
-            </a:extLst>
-          </p:cNvPr>
-          <p:cNvPicPr>
-            <a:picLocks noChangeAspect="1"/>
-          </p:cNvPicPr>
-          <p:nvPr/>
-        </p:nvPicPr>
-        <p:blipFill>
-          <a:blip r:embed="rId3"/>
-          <a:stretch>
-            <a:fillRect/>
-          </a:stretch>
-        </p:blipFill>
-        <p:spPr>
-          <a:xfrm>
-            <a:off x="838200" y="1690688"/>
-            <a:ext cx="5419323" cy="4747903"/>
-          </a:xfrm>
-          <a:prstGeom prst="rect">
-            <a:avLst/>
-          </a:prstGeom>
-        </p:spPr>
-      </p:pic>
-    </p:spTree>
-    <p:extLst>
-      <p:ext uri="{BB962C8B-B14F-4D97-AF65-F5344CB8AC3E}">
-        <p14:creationId xmlns:p14="http://schemas.microsoft.com/office/powerpoint/2010/main" val="634241247"/>
-      </p:ext>
-    </p:extLst>
-  </p:cSld>
-  <p:clrMapOvr>
-    <a:masterClrMapping/>
-  </p:clrMapOvr>
-</p:sld>
-</file>
-
-<file path=ppt/slides/slide4.xml><?xml version="1.0" encoding="utf-8"?>
-<p:sld xmlns:a="http://schemas.openxmlformats.org/drawingml/2006/main" xmlns:r="http://schemas.openxmlformats.org/officeDocument/2006/relationships" xmlns:p="http://schemas.openxmlformats.org/presentationml/2006/main">
-  <p:cSld>
-    <p:spTree>
-      <p:nvGrpSpPr>
-        <p:cNvPr id="1" name=""/>
-        <p:cNvGrpSpPr/>
-        <p:nvPr/>
-      </p:nvGrpSpPr>
-      <p:grpSpPr>
-        <a:xfrm>
-          <a:off x="0" y="0"/>
-          <a:ext cx="0" cy="0"/>
-          <a:chOff x="0" y="0"/>
-          <a:chExt cx="0" cy="0"/>
-        </a:xfrm>
-      </p:grpSpPr>
-      <p:sp>
-        <p:nvSpPr>
-          <p:cNvPr id="2" name="Title 1"/>
-          <p:cNvSpPr>
-            <a:spLocks noGrp="1"/>
-          </p:cNvSpPr>
-          <p:nvPr>
-            <p:ph type="title"/>
-          </p:nvPr>
-        </p:nvSpPr>
-        <p:spPr/>
-        <p:txBody>
-          <a:bodyPr/>
-          <a:lstStyle/>
-          <a:p>
-            <a:r>
-              <a:rPr lang="en-US" dirty="0"/>
-              <a:t>1. Do not declare unchecked exceptions</a:t>
-            </a:r>
-            <a:endParaRPr lang="en-US" b="1" dirty="0"/>
-          </a:p>
-        </p:txBody>
-      </p:sp>
-      <p:sp>
-        <p:nvSpPr>
-          <p:cNvPr id="4" name="Slide Number Placeholder 3"/>
-          <p:cNvSpPr>
-            <a:spLocks noGrp="1"/>
-          </p:cNvSpPr>
-          <p:nvPr>
-            <p:ph type="sldNum" sz="quarter" idx="12"/>
-          </p:nvPr>
-        </p:nvSpPr>
-        <p:spPr/>
-        <p:txBody>
-          <a:bodyPr/>
-          <a:lstStyle/>
-          <a:p>
-            <a:fld id="{C11E3E32-FD85-4051-B32D-C1D899658A24}" type="slidenum">
-              <a:rPr lang="en-US" smtClean="0"/>
-              <a:t>4</a:t>
             </a:fld>
             <a:endParaRPr lang="en-US"/>
           </a:p>
@@ -9897,7 +9703,7 @@
 </p:sld>
 </file>
 
-<file path=ppt/slides/slide5.xml><?xml version="1.0" encoding="utf-8"?>
+<file path=ppt/slides/slide4.xml><?xml version="1.0" encoding="utf-8"?>
 <p:sld xmlns:a="http://schemas.openxmlformats.org/drawingml/2006/main" xmlns:r="http://schemas.openxmlformats.org/officeDocument/2006/relationships" xmlns:p="http://schemas.openxmlformats.org/presentationml/2006/main">
   <p:cSld>
     <p:spTree>
@@ -9954,7 +9760,7 @@
           <a:p>
             <a:fld id="{C11E3E32-FD85-4051-B32D-C1D899658A24}" type="slidenum">
               <a:rPr lang="en-US" smtClean="0"/>
-              <a:t>5</a:t>
+              <a:t>4</a:t>
             </a:fld>
             <a:endParaRPr lang="en-US"/>
           </a:p>
@@ -10003,7 +9809,7 @@
 </p:sld>
 </file>
 
-<file path=ppt/slides/slide6.xml><?xml version="1.0" encoding="utf-8"?>
+<file path=ppt/slides/slide5.xml><?xml version="1.0" encoding="utf-8"?>
 <p:sld xmlns:a="http://schemas.openxmlformats.org/drawingml/2006/main" xmlns:r="http://schemas.openxmlformats.org/officeDocument/2006/relationships" xmlns:p="http://schemas.openxmlformats.org/presentationml/2006/main">
   <p:cSld>
     <p:spTree>
@@ -10072,7 +9878,7 @@
             <a:fld id="{C11E3E32-FD85-4051-B32D-C1D899658A24}" type="slidenum">
               <a:rPr lang="en-US" smtClean="0"/>
               <a:pPr/>
-              <a:t>6</a:t>
+              <a:t>5</a:t>
             </a:fld>
             <a:endParaRPr lang="en-US"/>
           </a:p>
@@ -10121,7 +9927,7 @@
 </p:sld>
 </file>
 
-<file path=ppt/slides/slide7.xml><?xml version="1.0" encoding="utf-8"?>
+<file path=ppt/slides/slide6.xml><?xml version="1.0" encoding="utf-8"?>
 <p:sld xmlns:a="http://schemas.openxmlformats.org/drawingml/2006/main" xmlns:r="http://schemas.openxmlformats.org/officeDocument/2006/relationships" xmlns:p="http://schemas.openxmlformats.org/presentationml/2006/main">
   <p:cSld>
     <p:spTree>
@@ -10190,7 +9996,7 @@
             <a:fld id="{C11E3E32-FD85-4051-B32D-C1D899658A24}" type="slidenum">
               <a:rPr lang="en-US" smtClean="0"/>
               <a:pPr/>
-              <a:t>7</a:t>
+              <a:t>6</a:t>
             </a:fld>
             <a:endParaRPr lang="en-US"/>
           </a:p>
@@ -10239,7 +10045,7 @@
 </p:sld>
 </file>
 
-<file path=ppt/slides/slide8.xml><?xml version="1.0" encoding="utf-8"?>
+<file path=ppt/slides/slide7.xml><?xml version="1.0" encoding="utf-8"?>
 <p:sld xmlns:a="http://schemas.openxmlformats.org/drawingml/2006/main" xmlns:r="http://schemas.openxmlformats.org/officeDocument/2006/relationships" xmlns:p="http://schemas.openxmlformats.org/presentationml/2006/main">
   <p:cSld>
     <p:spTree>
@@ -10308,7 +10114,7 @@
             <a:fld id="{C11E3E32-FD85-4051-B32D-C1D899658A24}" type="slidenum">
               <a:rPr lang="en-US" smtClean="0"/>
               <a:pPr/>
-              <a:t>8</a:t>
+              <a:t>7</a:t>
             </a:fld>
             <a:endParaRPr lang="en-US"/>
           </a:p>
@@ -10357,7 +10163,7 @@
 </p:sld>
 </file>
 
-<file path=ppt/slides/slide9.xml><?xml version="1.0" encoding="utf-8"?>
+<file path=ppt/slides/slide8.xml><?xml version="1.0" encoding="utf-8"?>
 <p:sld xmlns:a="http://schemas.openxmlformats.org/drawingml/2006/main" xmlns:r="http://schemas.openxmlformats.org/officeDocument/2006/relationships" xmlns:p="http://schemas.openxmlformats.org/presentationml/2006/main">
   <p:cSld>
     <p:spTree>
@@ -10426,7 +10232,7 @@
             <a:fld id="{C11E3E32-FD85-4051-B32D-C1D899658A24}" type="slidenum">
               <a:rPr lang="en-US" smtClean="0"/>
               <a:pPr/>
-              <a:t>9</a:t>
+              <a:t>8</a:t>
             </a:fld>
             <a:endParaRPr lang="en-US"/>
           </a:p>
@@ -10466,6 +10272,124 @@
     <p:extLst>
       <p:ext uri="{BB962C8B-B14F-4D97-AF65-F5344CB8AC3E}">
         <p14:creationId xmlns:p14="http://schemas.microsoft.com/office/powerpoint/2010/main" val="3574766315"/>
+      </p:ext>
+    </p:extLst>
+  </p:cSld>
+  <p:clrMapOvr>
+    <a:masterClrMapping/>
+  </p:clrMapOvr>
+</p:sld>
+</file>
+
+<file path=ppt/slides/slide9.xml><?xml version="1.0" encoding="utf-8"?>
+<p:sld xmlns:a="http://schemas.openxmlformats.org/drawingml/2006/main" xmlns:r="http://schemas.openxmlformats.org/officeDocument/2006/relationships" xmlns:p="http://schemas.openxmlformats.org/presentationml/2006/main">
+  <p:cSld>
+    <p:spTree>
+      <p:nvGrpSpPr>
+        <p:cNvPr id="1" name=""/>
+        <p:cNvGrpSpPr/>
+        <p:nvPr/>
+      </p:nvGrpSpPr>
+      <p:grpSpPr>
+        <a:xfrm>
+          <a:off x="0" y="0"/>
+          <a:ext cx="0" cy="0"/>
+          <a:chOff x="0" y="0"/>
+          <a:chExt cx="0" cy="0"/>
+        </a:xfrm>
+      </p:grpSpPr>
+      <p:sp>
+        <p:nvSpPr>
+          <p:cNvPr id="10" name="Заголовок 9">
+            <a:extLst>
+              <a:ext uri="{FF2B5EF4-FFF2-40B4-BE49-F238E27FC236}">
+                <a16:creationId xmlns:a16="http://schemas.microsoft.com/office/drawing/2014/main" id="{909B3017-F4BF-4B1F-BF61-6B6E83D556F0}"/>
+              </a:ext>
+            </a:extLst>
+          </p:cNvPr>
+          <p:cNvSpPr>
+            <a:spLocks noGrp="1"/>
+          </p:cNvSpPr>
+          <p:nvPr>
+            <p:ph type="title"/>
+          </p:nvPr>
+        </p:nvSpPr>
+        <p:spPr/>
+        <p:txBody>
+          <a:bodyPr/>
+          <a:lstStyle/>
+          <a:p>
+            <a:r>
+              <a:rPr lang="en-US" dirty="0"/>
+              <a:t>4. Do not repeat yourself</a:t>
+            </a:r>
+          </a:p>
+        </p:txBody>
+      </p:sp>
+      <p:sp>
+        <p:nvSpPr>
+          <p:cNvPr id="4" name="Місце для номера слайда 3">
+            <a:extLst>
+              <a:ext uri="{FF2B5EF4-FFF2-40B4-BE49-F238E27FC236}">
+                <a16:creationId xmlns:a16="http://schemas.microsoft.com/office/drawing/2014/main" id="{C5B93587-59CA-4580-89B4-58819BDFD0E5}"/>
+              </a:ext>
+            </a:extLst>
+          </p:cNvPr>
+          <p:cNvSpPr>
+            <a:spLocks noGrp="1"/>
+          </p:cNvSpPr>
+          <p:nvPr>
+            <p:ph type="sldNum" sz="quarter" idx="12"/>
+          </p:nvPr>
+        </p:nvSpPr>
+        <p:spPr/>
+        <p:txBody>
+          <a:bodyPr/>
+          <a:lstStyle/>
+          <a:p>
+            <a:fld id="{C11E3E32-FD85-4051-B32D-C1D899658A24}" type="slidenum">
+              <a:rPr lang="en-US" smtClean="0"/>
+              <a:pPr/>
+              <a:t>9</a:t>
+            </a:fld>
+            <a:endParaRPr lang="en-US"/>
+          </a:p>
+        </p:txBody>
+      </p:sp>
+      <p:pic>
+        <p:nvPicPr>
+          <p:cNvPr id="5" name="Рисунок 4">
+            <a:extLst>
+              <a:ext uri="{FF2B5EF4-FFF2-40B4-BE49-F238E27FC236}">
+                <a16:creationId xmlns:a16="http://schemas.microsoft.com/office/drawing/2014/main" id="{4EFBC76C-BB61-4223-8CCF-760CFF7CEF7D}"/>
+              </a:ext>
+            </a:extLst>
+          </p:cNvPr>
+          <p:cNvPicPr>
+            <a:picLocks noChangeAspect="1"/>
+          </p:cNvPicPr>
+          <p:nvPr/>
+        </p:nvPicPr>
+        <p:blipFill>
+          <a:blip r:embed="rId2"/>
+          <a:stretch>
+            <a:fillRect/>
+          </a:stretch>
+        </p:blipFill>
+        <p:spPr>
+          <a:xfrm>
+            <a:off x="838200" y="1690688"/>
+            <a:ext cx="4503821" cy="3726183"/>
+          </a:xfrm>
+          <a:prstGeom prst="rect">
+            <a:avLst/>
+          </a:prstGeom>
+        </p:spPr>
+      </p:pic>
+    </p:spTree>
+    <p:extLst>
+      <p:ext uri="{BB962C8B-B14F-4D97-AF65-F5344CB8AC3E}">
+        <p14:creationId xmlns:p14="http://schemas.microsoft.com/office/powerpoint/2010/main" val="1380537162"/>
       </p:ext>
     </p:extLst>
   </p:cSld>

</xml_diff>